<commit_message>
remove polling; base uri corrected; load solar panels into table
</commit_message>
<xml_diff>
--- a/presentation.pptx
+++ b/presentation.pptx
@@ -14,8 +14,8 @@
     <p:sldId id="304" r:id="rId5"/>
     <p:sldId id="305" r:id="rId6"/>
     <p:sldId id="286" r:id="rId7"/>
-    <p:sldId id="258" r:id="rId8"/>
-    <p:sldId id="290" r:id="rId9"/>
+    <p:sldId id="290" r:id="rId8"/>
+    <p:sldId id="258" r:id="rId9"/>
     <p:sldId id="289" r:id="rId10"/>
     <p:sldId id="288" r:id="rId11"/>
     <p:sldId id="292" r:id="rId12"/>
@@ -4060,11 +4060,14 @@
               <a:rPr lang="de-DE" dirty="0" smtClean="0"/>
               <a:t>)</a:t>
             </a:r>
-            <a:endParaRPr lang="de-DE" dirty="0" smtClean="0">
-              <a:solidFill>
-                <a:srgbClr val="FF0000"/>
-              </a:solidFill>
-            </a:endParaRPr>
+          </a:p>
+          <a:p>
+            <a:pPr lvl="1"/>
+            <a:r>
+              <a:rPr lang="de-DE" dirty="0" smtClean="0"/>
+              <a:t>Node.js &amp; NPM</a:t>
+            </a:r>
+            <a:endParaRPr lang="de-DE" dirty="0" smtClean="0"/>
           </a:p>
           <a:p>
             <a:pPr lvl="1"/>
@@ -17149,7 +17152,7 @@
           <a:graphicData uri="http://schemas.openxmlformats.org/presentationml/2006/ole">
             <mc:AlternateContent xmlns:mc="http://schemas.openxmlformats.org/markup-compatibility/2006">
               <mc:Choice xmlns:v="urn:schemas-microsoft-com:vml" Requires="v">
-                <p:oleObj spid="_x0000_s1035" name="Arbeitsblatt" r:id="rId3" imgW="11734682" imgH="4200525" progId="Excel.Sheet.12">
+                <p:oleObj spid="_x0000_s1038" name="Arbeitsblatt" r:id="rId3" imgW="11734682" imgH="4200525" progId="Excel.Sheet.12">
                   <p:embed/>
                 </p:oleObj>
               </mc:Choice>
@@ -18076,189 +18079,6 @@
 </file>
 
 <file path=ppt/slides/slide7.xml><?xml version="1.0" encoding="utf-8"?>
-<p:sld xmlns:a="http://schemas.openxmlformats.org/drawingml/2006/main" xmlns:r="http://schemas.openxmlformats.org/officeDocument/2006/relationships" xmlns:p="http://schemas.openxmlformats.org/presentationml/2006/main">
-  <p:cSld>
-    <p:spTree>
-      <p:nvGrpSpPr>
-        <p:cNvPr id="1" name=""/>
-        <p:cNvGrpSpPr/>
-        <p:nvPr/>
-      </p:nvGrpSpPr>
-      <p:grpSpPr>
-        <a:xfrm>
-          <a:off x="0" y="0"/>
-          <a:ext cx="0" cy="0"/>
-          <a:chOff x="0" y="0"/>
-          <a:chExt cx="0" cy="0"/>
-        </a:xfrm>
-      </p:grpSpPr>
-      <p:sp>
-        <p:nvSpPr>
-          <p:cNvPr id="2" name="Titel 1"/>
-          <p:cNvSpPr>
-            <a:spLocks noGrp="1"/>
-          </p:cNvSpPr>
-          <p:nvPr>
-            <p:ph type="title"/>
-          </p:nvPr>
-        </p:nvSpPr>
-        <p:spPr/>
-        <p:txBody>
-          <a:bodyPr/>
-          <a:lstStyle/>
-          <a:p>
-            <a:r>
-              <a:rPr lang="de-DE" dirty="0" smtClean="0"/>
-              <a:t>I Technologies</a:t>
-            </a:r>
-            <a:endParaRPr lang="de-DE" dirty="0"/>
-          </a:p>
-        </p:txBody>
-      </p:sp>
-      <p:sp>
-        <p:nvSpPr>
-          <p:cNvPr id="3" name="Inhaltsplatzhalter 2"/>
-          <p:cNvSpPr>
-            <a:spLocks noGrp="1"/>
-          </p:cNvSpPr>
-          <p:nvPr>
-            <p:ph idx="1"/>
-          </p:nvPr>
-        </p:nvSpPr>
-        <p:spPr/>
-        <p:txBody>
-          <a:bodyPr>
-            <a:normAutofit/>
-          </a:bodyPr>
-          <a:lstStyle/>
-          <a:p>
-            <a:r>
-              <a:rPr lang="en-US" dirty="0" smtClean="0"/>
-              <a:t>Jetty .. </a:t>
-            </a:r>
-            <a:r>
-              <a:rPr lang="en-US" dirty="0"/>
-              <a:t>a high-performance HTTP server.</a:t>
-            </a:r>
-          </a:p>
-          <a:p>
-            <a:r>
-              <a:rPr lang="en-US" dirty="0" smtClean="0"/>
-              <a:t>Jersey .. </a:t>
-            </a:r>
-            <a:r>
-              <a:rPr lang="en-US" dirty="0"/>
-              <a:t>a full-featured RESTful web framework.</a:t>
-            </a:r>
-          </a:p>
-          <a:p>
-            <a:r>
-              <a:rPr lang="en-US" dirty="0" smtClean="0"/>
-              <a:t>Jackson .. </a:t>
-            </a:r>
-            <a:r>
-              <a:rPr lang="en-US" dirty="0"/>
-              <a:t>the best JSON library for the JVM.</a:t>
-            </a:r>
-          </a:p>
-          <a:p>
-            <a:r>
-              <a:rPr lang="en-US" dirty="0" smtClean="0"/>
-              <a:t>Metrics .. </a:t>
-            </a:r>
-            <a:r>
-              <a:rPr lang="en-US" dirty="0"/>
-              <a:t>an excellent library for application metrics.</a:t>
-            </a:r>
-          </a:p>
-          <a:p>
-            <a:r>
-              <a:rPr lang="en-US" dirty="0" smtClean="0"/>
-              <a:t>Guava .. </a:t>
-            </a:r>
-            <a:r>
-              <a:rPr lang="en-US" dirty="0"/>
-              <a:t>Google’s excellent utility library</a:t>
-            </a:r>
-            <a:r>
-              <a:rPr lang="en-US" dirty="0" smtClean="0"/>
-              <a:t>.</a:t>
-            </a:r>
-          </a:p>
-          <a:p>
-            <a:r>
-              <a:rPr lang="en-US" dirty="0" smtClean="0"/>
-              <a:t>Log4J .. a crunchy logging framework.</a:t>
-            </a:r>
-          </a:p>
-          <a:p>
-            <a:r>
-              <a:rPr lang="en-US" dirty="0" smtClean="0">
-                <a:hlinkClick r:id="rId2"/>
-              </a:rPr>
-              <a:t>JDBI</a:t>
-            </a:r>
-            <a:r>
-              <a:rPr lang="en-US" dirty="0" smtClean="0"/>
-              <a:t> .. fluent or SQL object style API detailed as JDBC.</a:t>
-            </a:r>
-          </a:p>
-          <a:p>
-            <a:r>
-              <a:rPr lang="en-US" dirty="0" err="1" smtClean="0">
-                <a:hlinkClick r:id="rId3"/>
-              </a:rPr>
-              <a:t>Liquibase</a:t>
-            </a:r>
-            <a:r>
-              <a:rPr lang="en-US" dirty="0" smtClean="0"/>
-              <a:t> .. manage </a:t>
-            </a:r>
-            <a:r>
-              <a:rPr lang="de-DE" dirty="0" err="1" smtClean="0"/>
-              <a:t>database</a:t>
-            </a:r>
-            <a:r>
-              <a:rPr lang="de-DE" dirty="0" smtClean="0"/>
-              <a:t> </a:t>
-            </a:r>
-            <a:r>
-              <a:rPr lang="de-DE" dirty="0" err="1"/>
-              <a:t>schema</a:t>
-            </a:r>
-            <a:r>
-              <a:rPr lang="de-DE" dirty="0"/>
-              <a:t> </a:t>
-            </a:r>
-            <a:r>
-              <a:rPr lang="de-DE" dirty="0" err="1"/>
-              <a:t>changes</a:t>
-            </a:r>
-            <a:endParaRPr lang="en-US" dirty="0"/>
-          </a:p>
-        </p:txBody>
-      </p:sp>
-    </p:spTree>
-    <p:extLst>
-      <p:ext uri="{BB962C8B-B14F-4D97-AF65-F5344CB8AC3E}">
-        <p14:creationId xmlns:p14="http://schemas.microsoft.com/office/powerpoint/2010/main" val="139519354"/>
-      </p:ext>
-    </p:extLst>
-  </p:cSld>
-  <p:clrMapOvr>
-    <a:masterClrMapping/>
-  </p:clrMapOvr>
-  <p:timing>
-    <p:tnLst>
-      <p:par>
-        <p:cTn id="1" dur="indefinite" restart="never" nodeType="tmRoot"/>
-      </p:par>
-    </p:tnLst>
-  </p:timing>
-</p:sld>
-</file>
-
-<file path=ppt/slides/slide8.xml><?xml version="1.0" encoding="utf-8"?>
 <p:sld xmlns:a="http://schemas.openxmlformats.org/drawingml/2006/main" xmlns:r="http://schemas.openxmlformats.org/officeDocument/2006/relationships" xmlns:p="http://schemas.openxmlformats.org/presentationml/2006/main">
   <p:cSld>
     <p:spTree>
@@ -18939,6 +18759,189 @@
 </p:sld>
 </file>
 
+<file path=ppt/slides/slide8.xml><?xml version="1.0" encoding="utf-8"?>
+<p:sld xmlns:a="http://schemas.openxmlformats.org/drawingml/2006/main" xmlns:r="http://schemas.openxmlformats.org/officeDocument/2006/relationships" xmlns:p="http://schemas.openxmlformats.org/presentationml/2006/main">
+  <p:cSld>
+    <p:spTree>
+      <p:nvGrpSpPr>
+        <p:cNvPr id="1" name=""/>
+        <p:cNvGrpSpPr/>
+        <p:nvPr/>
+      </p:nvGrpSpPr>
+      <p:grpSpPr>
+        <a:xfrm>
+          <a:off x="0" y="0"/>
+          <a:ext cx="0" cy="0"/>
+          <a:chOff x="0" y="0"/>
+          <a:chExt cx="0" cy="0"/>
+        </a:xfrm>
+      </p:grpSpPr>
+      <p:sp>
+        <p:nvSpPr>
+          <p:cNvPr id="2" name="Titel 1"/>
+          <p:cNvSpPr>
+            <a:spLocks noGrp="1"/>
+          </p:cNvSpPr>
+          <p:nvPr>
+            <p:ph type="title"/>
+          </p:nvPr>
+        </p:nvSpPr>
+        <p:spPr/>
+        <p:txBody>
+          <a:bodyPr/>
+          <a:lstStyle/>
+          <a:p>
+            <a:r>
+              <a:rPr lang="de-DE" dirty="0" smtClean="0"/>
+              <a:t>I Technologies</a:t>
+            </a:r>
+            <a:endParaRPr lang="de-DE" dirty="0"/>
+          </a:p>
+        </p:txBody>
+      </p:sp>
+      <p:sp>
+        <p:nvSpPr>
+          <p:cNvPr id="3" name="Inhaltsplatzhalter 2"/>
+          <p:cNvSpPr>
+            <a:spLocks noGrp="1"/>
+          </p:cNvSpPr>
+          <p:nvPr>
+            <p:ph idx="1"/>
+          </p:nvPr>
+        </p:nvSpPr>
+        <p:spPr/>
+        <p:txBody>
+          <a:bodyPr>
+            <a:normAutofit/>
+          </a:bodyPr>
+          <a:lstStyle/>
+          <a:p>
+            <a:r>
+              <a:rPr lang="en-US" dirty="0" smtClean="0"/>
+              <a:t>Jetty .. </a:t>
+            </a:r>
+            <a:r>
+              <a:rPr lang="en-US" dirty="0"/>
+              <a:t>a high-performance HTTP server.</a:t>
+            </a:r>
+          </a:p>
+          <a:p>
+            <a:r>
+              <a:rPr lang="en-US" dirty="0" smtClean="0"/>
+              <a:t>Jersey .. </a:t>
+            </a:r>
+            <a:r>
+              <a:rPr lang="en-US" dirty="0"/>
+              <a:t>a full-featured RESTful web framework.</a:t>
+            </a:r>
+          </a:p>
+          <a:p>
+            <a:r>
+              <a:rPr lang="en-US" dirty="0" smtClean="0"/>
+              <a:t>Jackson .. </a:t>
+            </a:r>
+            <a:r>
+              <a:rPr lang="en-US" dirty="0"/>
+              <a:t>the best JSON library for the JVM.</a:t>
+            </a:r>
+          </a:p>
+          <a:p>
+            <a:r>
+              <a:rPr lang="en-US" dirty="0" smtClean="0"/>
+              <a:t>Metrics .. </a:t>
+            </a:r>
+            <a:r>
+              <a:rPr lang="en-US" dirty="0"/>
+              <a:t>an excellent library for application metrics.</a:t>
+            </a:r>
+          </a:p>
+          <a:p>
+            <a:r>
+              <a:rPr lang="en-US" dirty="0" smtClean="0"/>
+              <a:t>Guava .. </a:t>
+            </a:r>
+            <a:r>
+              <a:rPr lang="en-US" dirty="0"/>
+              <a:t>Google’s excellent utility library</a:t>
+            </a:r>
+            <a:r>
+              <a:rPr lang="en-US" dirty="0" smtClean="0"/>
+              <a:t>.</a:t>
+            </a:r>
+          </a:p>
+          <a:p>
+            <a:r>
+              <a:rPr lang="en-US" dirty="0" smtClean="0"/>
+              <a:t>Log4J .. a crunchy logging framework.</a:t>
+            </a:r>
+          </a:p>
+          <a:p>
+            <a:r>
+              <a:rPr lang="en-US" dirty="0" smtClean="0">
+                <a:hlinkClick r:id="rId2"/>
+              </a:rPr>
+              <a:t>JDBI</a:t>
+            </a:r>
+            <a:r>
+              <a:rPr lang="en-US" dirty="0" smtClean="0"/>
+              <a:t> .. fluent or SQL object style API detailed as JDBC.</a:t>
+            </a:r>
+          </a:p>
+          <a:p>
+            <a:r>
+              <a:rPr lang="en-US" dirty="0" err="1" smtClean="0">
+                <a:hlinkClick r:id="rId3"/>
+              </a:rPr>
+              <a:t>Liquibase</a:t>
+            </a:r>
+            <a:r>
+              <a:rPr lang="en-US" dirty="0" smtClean="0"/>
+              <a:t> .. manage </a:t>
+            </a:r>
+            <a:r>
+              <a:rPr lang="de-DE" dirty="0" err="1" smtClean="0"/>
+              <a:t>database</a:t>
+            </a:r>
+            <a:r>
+              <a:rPr lang="de-DE" dirty="0" smtClean="0"/>
+              <a:t> </a:t>
+            </a:r>
+            <a:r>
+              <a:rPr lang="de-DE" dirty="0" err="1"/>
+              <a:t>schema</a:t>
+            </a:r>
+            <a:r>
+              <a:rPr lang="de-DE" dirty="0"/>
+              <a:t> </a:t>
+            </a:r>
+            <a:r>
+              <a:rPr lang="de-DE" dirty="0" err="1"/>
+              <a:t>changes</a:t>
+            </a:r>
+            <a:endParaRPr lang="en-US" dirty="0"/>
+          </a:p>
+        </p:txBody>
+      </p:sp>
+    </p:spTree>
+    <p:extLst>
+      <p:ext uri="{BB962C8B-B14F-4D97-AF65-F5344CB8AC3E}">
+        <p14:creationId xmlns:p14="http://schemas.microsoft.com/office/powerpoint/2010/main" val="139519354"/>
+      </p:ext>
+    </p:extLst>
+  </p:cSld>
+  <p:clrMapOvr>
+    <a:masterClrMapping/>
+  </p:clrMapOvr>
+  <p:timing>
+    <p:tnLst>
+      <p:par>
+        <p:cTn id="1" dur="indefinite" restart="never" nodeType="tmRoot"/>
+      </p:par>
+    </p:tnLst>
+  </p:timing>
+</p:sld>
+</file>
+
 <file path=ppt/slides/slide9.xml><?xml version="1.0" encoding="utf-8"?>
 <p:sld xmlns:a="http://schemas.openxmlformats.org/drawingml/2006/main" xmlns:r="http://schemas.openxmlformats.org/officeDocument/2006/relationships" xmlns:p="http://schemas.openxmlformats.org/presentationml/2006/main">
   <p:cSld>

</xml_diff>